<commit_message>
updated version of the final presentation
</commit_message>
<xml_diff>
--- a/doc/HoneyBadgersFinalPresentation.pptx
+++ b/doc/HoneyBadgersFinalPresentation.pptx
@@ -25,6 +25,7 @@
     <p:sldId id="270" r:id="rId20"/>
     <p:sldId id="271" r:id="rId21"/>
     <p:sldId id="272" r:id="rId22"/>
+    <p:sldId id="273" r:id="rId23"/>
   </p:sldIdLst>
   <p:sldSz cy="5143500" cx="9144000"/>
   <p:notesSz cy="9144000" cx="6858000"/>
@@ -501,7 +502,7 @@
   <p:cSld>
     <p:spTree>
       <p:nvGrpSpPr>
-        <p:cNvPr id="98" name="Shape 98"/>
+        <p:cNvPr id="97" name="Shape 97"/>
         <p:cNvGrpSpPr/>
         <p:nvPr/>
       </p:nvGrpSpPr>
@@ -515,7 +516,7 @@
       </p:grpSpPr>
       <p:sp>
         <p:nvSpPr>
-          <p:cNvPr id="99" name="Shape 99"/>
+          <p:cNvPr id="98" name="Shape 98"/>
           <p:cNvSpPr/>
           <p:nvPr>
             <p:ph idx="2" type="sldImg"/>
@@ -559,7 +560,7 @@
       </p:sp>
       <p:sp>
         <p:nvSpPr>
-          <p:cNvPr id="100" name="Shape 100"/>
+          <p:cNvPr id="99" name="Shape 99"/>
           <p:cNvSpPr txBox="1"/>
           <p:nvPr>
             <p:ph idx="1" type="body"/>
@@ -606,7 +607,7 @@
   <p:cSld>
     <p:spTree>
       <p:nvGrpSpPr>
-        <p:cNvPr id="106" name="Shape 106"/>
+        <p:cNvPr id="104" name="Shape 104"/>
         <p:cNvGrpSpPr/>
         <p:nvPr/>
       </p:nvGrpSpPr>
@@ -620,7 +621,7 @@
       </p:grpSpPr>
       <p:sp>
         <p:nvSpPr>
-          <p:cNvPr id="107" name="Shape 107"/>
+          <p:cNvPr id="105" name="Shape 105"/>
           <p:cNvSpPr/>
           <p:nvPr>
             <p:ph idx="2" type="sldImg"/>
@@ -664,7 +665,7 @@
       </p:sp>
       <p:sp>
         <p:nvSpPr>
-          <p:cNvPr id="108" name="Shape 108"/>
+          <p:cNvPr id="106" name="Shape 106"/>
           <p:cNvSpPr txBox="1"/>
           <p:nvPr>
             <p:ph idx="1" type="body"/>
@@ -711,7 +712,7 @@
   <p:cSld>
     <p:spTree>
       <p:nvGrpSpPr>
-        <p:cNvPr id="114" name="Shape 114"/>
+        <p:cNvPr id="112" name="Shape 112"/>
         <p:cNvGrpSpPr/>
         <p:nvPr/>
       </p:nvGrpSpPr>
@@ -725,7 +726,7 @@
       </p:grpSpPr>
       <p:sp>
         <p:nvSpPr>
-          <p:cNvPr id="115" name="Shape 115"/>
+          <p:cNvPr id="113" name="Shape 113"/>
           <p:cNvSpPr/>
           <p:nvPr>
             <p:ph idx="2" type="sldImg"/>
@@ -769,7 +770,7 @@
       </p:sp>
       <p:sp>
         <p:nvSpPr>
-          <p:cNvPr id="116" name="Shape 116"/>
+          <p:cNvPr id="114" name="Shape 114"/>
           <p:cNvSpPr txBox="1"/>
           <p:nvPr>
             <p:ph idx="1" type="body"/>
@@ -816,7 +817,7 @@
   <p:cSld>
     <p:spTree>
       <p:nvGrpSpPr>
-        <p:cNvPr id="122" name="Shape 122"/>
+        <p:cNvPr id="120" name="Shape 120"/>
         <p:cNvGrpSpPr/>
         <p:nvPr/>
       </p:nvGrpSpPr>
@@ -830,7 +831,7 @@
       </p:grpSpPr>
       <p:sp>
         <p:nvSpPr>
-          <p:cNvPr id="123" name="Shape 123"/>
+          <p:cNvPr id="121" name="Shape 121"/>
           <p:cNvSpPr/>
           <p:nvPr>
             <p:ph idx="2" type="sldImg"/>
@@ -874,7 +875,7 @@
       </p:sp>
       <p:sp>
         <p:nvSpPr>
-          <p:cNvPr id="124" name="Shape 124"/>
+          <p:cNvPr id="122" name="Shape 122"/>
           <p:cNvSpPr txBox="1"/>
           <p:nvPr>
             <p:ph idx="1" type="body"/>
@@ -921,7 +922,7 @@
   <p:cSld>
     <p:spTree>
       <p:nvGrpSpPr>
-        <p:cNvPr id="130" name="Shape 130"/>
+        <p:cNvPr id="128" name="Shape 128"/>
         <p:cNvGrpSpPr/>
         <p:nvPr/>
       </p:nvGrpSpPr>
@@ -935,7 +936,7 @@
       </p:grpSpPr>
       <p:sp>
         <p:nvSpPr>
-          <p:cNvPr id="131" name="Shape 131"/>
+          <p:cNvPr id="129" name="Shape 129"/>
           <p:cNvSpPr/>
           <p:nvPr>
             <p:ph idx="2" type="sldImg"/>
@@ -979,7 +980,7 @@
       </p:sp>
       <p:sp>
         <p:nvSpPr>
-          <p:cNvPr id="132" name="Shape 132"/>
+          <p:cNvPr id="130" name="Shape 130"/>
           <p:cNvSpPr txBox="1"/>
           <p:nvPr>
             <p:ph idx="1" type="body"/>
@@ -1026,7 +1027,7 @@
   <p:cSld>
     <p:spTree>
       <p:nvGrpSpPr>
-        <p:cNvPr id="138" name="Shape 138"/>
+        <p:cNvPr id="136" name="Shape 136"/>
         <p:cNvGrpSpPr/>
         <p:nvPr/>
       </p:nvGrpSpPr>
@@ -1040,7 +1041,7 @@
       </p:grpSpPr>
       <p:sp>
         <p:nvSpPr>
-          <p:cNvPr id="139" name="Shape 139"/>
+          <p:cNvPr id="137" name="Shape 137"/>
           <p:cNvSpPr/>
           <p:nvPr>
             <p:ph idx="2" type="sldImg"/>
@@ -1084,7 +1085,7 @@
       </p:sp>
       <p:sp>
         <p:nvSpPr>
-          <p:cNvPr id="140" name="Shape 140"/>
+          <p:cNvPr id="138" name="Shape 138"/>
           <p:cNvSpPr txBox="1"/>
           <p:nvPr>
             <p:ph idx="1" type="body"/>
@@ -1131,7 +1132,7 @@
   <p:cSld>
     <p:spTree>
       <p:nvGrpSpPr>
-        <p:cNvPr id="146" name="Shape 146"/>
+        <p:cNvPr id="144" name="Shape 144"/>
         <p:cNvGrpSpPr/>
         <p:nvPr/>
       </p:nvGrpSpPr>
@@ -1145,7 +1146,7 @@
       </p:grpSpPr>
       <p:sp>
         <p:nvSpPr>
-          <p:cNvPr id="147" name="Shape 147"/>
+          <p:cNvPr id="145" name="Shape 145"/>
           <p:cNvSpPr/>
           <p:nvPr>
             <p:ph idx="2" type="sldImg"/>
@@ -1189,7 +1190,7 @@
       </p:sp>
       <p:sp>
         <p:nvSpPr>
-          <p:cNvPr id="148" name="Shape 148"/>
+          <p:cNvPr id="146" name="Shape 146"/>
           <p:cNvSpPr txBox="1"/>
           <p:nvPr>
             <p:ph idx="1" type="body"/>
@@ -1236,7 +1237,7 @@
   <p:cSld>
     <p:spTree>
       <p:nvGrpSpPr>
-        <p:cNvPr id="151" name="Shape 151"/>
+        <p:cNvPr id="152" name="Shape 152"/>
         <p:cNvGrpSpPr/>
         <p:nvPr/>
       </p:nvGrpSpPr>
@@ -1250,7 +1251,7 @@
       </p:grpSpPr>
       <p:sp>
         <p:nvSpPr>
-          <p:cNvPr id="152" name="Shape 152"/>
+          <p:cNvPr id="153" name="Shape 153"/>
           <p:cNvSpPr/>
           <p:nvPr>
             <p:ph idx="2" type="sldImg"/>
@@ -1294,7 +1295,112 @@
       </p:sp>
       <p:sp>
         <p:nvSpPr>
-          <p:cNvPr id="153" name="Shape 153"/>
+          <p:cNvPr id="154" name="Shape 154"/>
+          <p:cNvSpPr txBox="1"/>
+          <p:nvPr>
+            <p:ph idx="1" type="body"/>
+          </p:nvPr>
+        </p:nvSpPr>
+        <p:spPr>
+          <a:xfrm>
+            <a:off y="4343400" x="685800"/>
+            <a:ext cy="4114800" cx="5486399"/>
+          </a:xfrm>
+          <a:prstGeom prst="rect">
+            <a:avLst/>
+          </a:prstGeom>
+        </p:spPr>
+        <p:txBody>
+          <a:bodyPr bIns="91425" rIns="91425" lIns="91425" tIns="91425" anchor="t" anchorCtr="0">
+            <a:noAutofit/>
+          </a:bodyPr>
+          <a:lstStyle/>
+          <a:p>
+            <a:pPr>
+              <a:spcBef>
+                <a:spcPts val="0"/>
+              </a:spcBef>
+              <a:buNone/>
+            </a:pPr>
+            <a:r>
+              <a:t/>
+            </a:r>
+            <a:endParaRPr/>
+          </a:p>
+        </p:txBody>
+      </p:sp>
+    </p:spTree>
+  </p:cSld>
+  <p:clrMapOvr>
+    <a:masterClrMapping/>
+  </p:clrMapOvr>
+</p:notes>
+</file>
+
+<file path=ppt/notesSlides/notesSlide18.xml><?xml version="1.0" encoding="utf-8"?>
+<p:notes xmlns:a="http://schemas.openxmlformats.org/drawingml/2006/main" xmlns:r="http://schemas.openxmlformats.org/officeDocument/2006/relationships" xmlns:mc="http://schemas.openxmlformats.org/markup-compatibility/2006" xmlns:mv="urn:schemas-microsoft-com:mac:vml" xmlns:p="http://schemas.openxmlformats.org/presentationml/2006/main" xmlns:c="http://schemas.openxmlformats.org/drawingml/2006/chart" xmlns:dgm="http://schemas.openxmlformats.org/drawingml/2006/diagram" xmlns:o="urn:schemas-microsoft-com:office:office" xmlns:v="urn:schemas-microsoft-com:vml" xmlns:pvml="urn:schemas-microsoft-com:office:powerpoint" xmlns:com="http://schemas.openxmlformats.org/drawingml/2006/compatibility" xmlns:p14="http://schemas.microsoft.com/office/powerpoint/2010/main" showMasterSp="0" showMasterPhAnim="0">
+  <p:cSld>
+    <p:spTree>
+      <p:nvGrpSpPr>
+        <p:cNvPr id="157" name="Shape 157"/>
+        <p:cNvGrpSpPr/>
+        <p:nvPr/>
+      </p:nvGrpSpPr>
+      <p:grpSpPr>
+        <a:xfrm>
+          <a:off y="0" x="0"/>
+          <a:ext cy="0" cx="0"/>
+          <a:chOff y="0" x="0"/>
+          <a:chExt cy="0" cx="0"/>
+        </a:xfrm>
+      </p:grpSpPr>
+      <p:sp>
+        <p:nvSpPr>
+          <p:cNvPr id="158" name="Shape 158"/>
+          <p:cNvSpPr/>
+          <p:nvPr>
+            <p:ph idx="2" type="sldImg"/>
+          </p:nvPr>
+        </p:nvSpPr>
+        <p:spPr>
+          <a:xfrm>
+            <a:off y="685800" x="381187"/>
+            <a:ext cy="3429000" cx="6096299"/>
+          </a:xfrm>
+          <a:custGeom>
+            <a:pathLst>
+              <a:path w="120000" extrusionOk="0" h="120000">
+                <a:moveTo>
+                  <a:pt y="0" x="0"/>
+                </a:moveTo>
+                <a:lnTo>
+                  <a:pt y="0" x="120000"/>
+                </a:lnTo>
+                <a:lnTo>
+                  <a:pt y="120000" x="120000"/>
+                </a:lnTo>
+                <a:lnTo>
+                  <a:pt y="120000" x="0"/>
+                </a:lnTo>
+                <a:close/>
+              </a:path>
+            </a:pathLst>
+          </a:custGeom>
+          <a:noFill/>
+          <a:ln w="9525" cap="flat">
+            <a:solidFill>
+              <a:srgbClr val="000000"/>
+            </a:solidFill>
+            <a:prstDash val="solid"/>
+            <a:round/>
+            <a:headEnd w="med" len="med" type="none"/>
+            <a:tailEnd w="med" len="med" type="none"/>
+          </a:ln>
+        </p:spPr>
+      </p:sp>
+      <p:sp>
+        <p:nvSpPr>
+          <p:cNvPr id="159" name="Shape 159"/>
           <p:cNvSpPr txBox="1"/>
           <p:nvPr>
             <p:ph idx="1" type="body"/>
@@ -1656,7 +1762,7 @@
   <p:cSld>
     <p:spTree>
       <p:nvGrpSpPr>
-        <p:cNvPr id="60" name="Shape 60"/>
+        <p:cNvPr id="57" name="Shape 57"/>
         <p:cNvGrpSpPr/>
         <p:nvPr/>
       </p:nvGrpSpPr>
@@ -1670,7 +1776,7 @@
       </p:grpSpPr>
       <p:sp>
         <p:nvSpPr>
-          <p:cNvPr id="61" name="Shape 61"/>
+          <p:cNvPr id="58" name="Shape 58"/>
           <p:cNvSpPr/>
           <p:nvPr>
             <p:ph idx="2" type="sldImg"/>
@@ -1714,7 +1820,7 @@
       </p:sp>
       <p:sp>
         <p:nvSpPr>
-          <p:cNvPr id="62" name="Shape 62"/>
+          <p:cNvPr id="59" name="Shape 59"/>
           <p:cNvSpPr txBox="1"/>
           <p:nvPr>
             <p:ph idx="1" type="body"/>
@@ -1761,7 +1867,7 @@
   <p:cSld>
     <p:spTree>
       <p:nvGrpSpPr>
-        <p:cNvPr id="68" name="Shape 68"/>
+        <p:cNvPr id="66" name="Shape 66"/>
         <p:cNvGrpSpPr/>
         <p:nvPr/>
       </p:nvGrpSpPr>
@@ -1775,7 +1881,7 @@
       </p:grpSpPr>
       <p:sp>
         <p:nvSpPr>
-          <p:cNvPr id="69" name="Shape 69"/>
+          <p:cNvPr id="67" name="Shape 67"/>
           <p:cNvSpPr/>
           <p:nvPr>
             <p:ph idx="2" type="sldImg"/>
@@ -1819,7 +1925,7 @@
       </p:sp>
       <p:sp>
         <p:nvSpPr>
-          <p:cNvPr id="70" name="Shape 70"/>
+          <p:cNvPr id="68" name="Shape 68"/>
           <p:cNvSpPr txBox="1"/>
           <p:nvPr>
             <p:ph idx="1" type="body"/>
@@ -1866,7 +1972,7 @@
   <p:cSld>
     <p:spTree>
       <p:nvGrpSpPr>
-        <p:cNvPr id="76" name="Shape 76"/>
+        <p:cNvPr id="74" name="Shape 74"/>
         <p:cNvGrpSpPr/>
         <p:nvPr/>
       </p:nvGrpSpPr>
@@ -1880,7 +1986,7 @@
       </p:grpSpPr>
       <p:sp>
         <p:nvSpPr>
-          <p:cNvPr id="77" name="Shape 77"/>
+          <p:cNvPr id="75" name="Shape 75"/>
           <p:cNvSpPr/>
           <p:nvPr>
             <p:ph idx="2" type="sldImg"/>
@@ -1924,7 +2030,7 @@
       </p:sp>
       <p:sp>
         <p:nvSpPr>
-          <p:cNvPr id="78" name="Shape 78"/>
+          <p:cNvPr id="76" name="Shape 76"/>
           <p:cNvSpPr txBox="1"/>
           <p:nvPr>
             <p:ph idx="1" type="body"/>
@@ -1971,7 +2077,7 @@
   <p:cSld>
     <p:spTree>
       <p:nvGrpSpPr>
-        <p:cNvPr id="84" name="Shape 84"/>
+        <p:cNvPr id="82" name="Shape 82"/>
         <p:cNvGrpSpPr/>
         <p:nvPr/>
       </p:nvGrpSpPr>
@@ -1985,7 +2091,7 @@
       </p:grpSpPr>
       <p:sp>
         <p:nvSpPr>
-          <p:cNvPr id="85" name="Shape 85"/>
+          <p:cNvPr id="83" name="Shape 83"/>
           <p:cNvSpPr/>
           <p:nvPr>
             <p:ph idx="2" type="sldImg"/>
@@ -2029,7 +2135,7 @@
       </p:sp>
       <p:sp>
         <p:nvSpPr>
-          <p:cNvPr id="86" name="Shape 86"/>
+          <p:cNvPr id="84" name="Shape 84"/>
           <p:cNvSpPr txBox="1"/>
           <p:nvPr>
             <p:ph idx="1" type="body"/>
@@ -2076,7 +2182,7 @@
   <p:cSld>
     <p:spTree>
       <p:nvGrpSpPr>
-        <p:cNvPr id="91" name="Shape 91"/>
+        <p:cNvPr id="90" name="Shape 90"/>
         <p:cNvGrpSpPr/>
         <p:nvPr/>
       </p:nvGrpSpPr>
@@ -2090,7 +2196,7 @@
       </p:grpSpPr>
       <p:sp>
         <p:nvSpPr>
-          <p:cNvPr id="92" name="Shape 92"/>
+          <p:cNvPr id="91" name="Shape 91"/>
           <p:cNvSpPr/>
           <p:nvPr>
             <p:ph idx="2" type="sldImg"/>
@@ -2134,7 +2240,7 @@
       </p:sp>
       <p:sp>
         <p:nvSpPr>
-          <p:cNvPr id="93" name="Shape 93"/>
+          <p:cNvPr id="92" name="Shape 92"/>
           <p:cNvSpPr txBox="1"/>
           <p:nvPr>
             <p:ph idx="1" type="body"/>
@@ -4391,7 +4497,7 @@
   <p:cSld>
     <p:spTree>
       <p:nvGrpSpPr>
-        <p:cNvPr id="94" name="Shape 94"/>
+        <p:cNvPr id="93" name="Shape 93"/>
         <p:cNvGrpSpPr/>
         <p:nvPr/>
       </p:nvGrpSpPr>
@@ -4405,7 +4511,7 @@
       </p:grpSpPr>
       <p:pic>
         <p:nvPicPr>
-          <p:cNvPr id="95" name="Shape 95"/>
+          <p:cNvPr id="94" name="Shape 94"/>
           <p:cNvPicPr preferRelativeResize="0"/>
           <p:nvPr/>
         </p:nvPicPr>
@@ -4419,8 +4525,8 @@
         </p:blipFill>
         <p:spPr>
           <a:xfrm>
-            <a:off y="1086800" x="229025"/>
-            <a:ext cy="4056700" cx="8685948"/>
+            <a:off y="1124925" x="229025"/>
+            <a:ext cy="4098099" cx="8685948"/>
           </a:xfrm>
           <a:prstGeom prst="rect">
             <a:avLst/>
@@ -4433,14 +4539,14 @@
       </p:pic>
       <p:sp>
         <p:nvSpPr>
-          <p:cNvPr id="96" name="Shape 96"/>
+          <p:cNvPr id="95" name="Shape 95"/>
           <p:cNvSpPr/>
           <p:nvPr/>
         </p:nvSpPr>
         <p:spPr>
           <a:xfrm flipH="1">
-            <a:off y="3811650" x="598375"/>
-            <a:ext cy="675899" cx="2163299"/>
+            <a:off y="1636875" x="4165450"/>
+            <a:ext cy="1005899" cx="2163299"/>
           </a:xfrm>
           <a:prstGeom prst="wedgeRectCallout">
             <a:avLst>
@@ -4482,7 +4588,150 @@
       </p:sp>
       <p:sp>
         <p:nvSpPr>
-          <p:cNvPr id="97" name="Shape 97"/>
+          <p:cNvPr id="96" name="Shape 96"/>
+          <p:cNvSpPr txBox="1"/>
+          <p:nvPr/>
+        </p:nvSpPr>
+        <p:spPr>
+          <a:xfrm>
+            <a:off y="1636875" x="4165450"/>
+            <a:ext cy="1005899" cx="2163299"/>
+          </a:xfrm>
+          <a:prstGeom prst="rect">
+            <a:avLst/>
+          </a:prstGeom>
+          <a:noFill/>
+          <a:ln>
+            <a:noFill/>
+          </a:ln>
+        </p:spPr>
+        <p:txBody>
+          <a:bodyPr bIns="91425" rIns="91425" lIns="91425" tIns="91425" anchor="t" anchorCtr="0">
+            <a:noAutofit/>
+          </a:bodyPr>
+          <a:lstStyle/>
+          <a:p>
+            <a:pPr rtl="0" lvl="0">
+              <a:spcBef>
+                <a:spcPts val="0"/>
+              </a:spcBef>
+              <a:buNone/>
+            </a:pPr>
+            <a:r>
+              <a:rPr lang="en"/>
+              <a:t>Login bar.  Without logging in you have access to a limited number of apps</a:t>
+            </a:r>
+          </a:p>
+        </p:txBody>
+      </p:sp>
+    </p:spTree>
+  </p:cSld>
+  <p:clrMapOvr>
+    <a:masterClrMapping/>
+  </p:clrMapOvr>
+  <p:transition spd="slow">
+    <p:cut/>
+  </p:transition>
+</p:sld>
+</file>
+
+<file path=ppt/slides/slide11.xml><?xml version="1.0" encoding="utf-8"?>
+<p:sld xmlns:a="http://schemas.openxmlformats.org/drawingml/2006/main" xmlns:r="http://schemas.openxmlformats.org/officeDocument/2006/relationships" xmlns:mc="http://schemas.openxmlformats.org/markup-compatibility/2006" xmlns:mv="urn:schemas-microsoft-com:mac:vml" xmlns:p="http://schemas.openxmlformats.org/presentationml/2006/main" xmlns:c="http://schemas.openxmlformats.org/drawingml/2006/chart" xmlns:dgm="http://schemas.openxmlformats.org/drawingml/2006/diagram" xmlns:o="urn:schemas-microsoft-com:office:office" xmlns:v="urn:schemas-microsoft-com:vml" xmlns:pvml="urn:schemas-microsoft-com:office:powerpoint" xmlns:com="http://schemas.openxmlformats.org/drawingml/2006/compatibility" xmlns:p14="http://schemas.microsoft.com/office/powerpoint/2010/main">
+  <p:cSld>
+    <p:spTree>
+      <p:nvGrpSpPr>
+        <p:cNvPr id="100" name="Shape 100"/>
+        <p:cNvGrpSpPr/>
+        <p:nvPr/>
+      </p:nvGrpSpPr>
+      <p:grpSpPr>
+        <a:xfrm>
+          <a:off y="0" x="0"/>
+          <a:ext cy="0" cx="0"/>
+          <a:chOff y="0" x="0"/>
+          <a:chExt cy="0" cx="0"/>
+        </a:xfrm>
+      </p:grpSpPr>
+      <p:pic>
+        <p:nvPicPr>
+          <p:cNvPr id="101" name="Shape 101"/>
+          <p:cNvPicPr preferRelativeResize="0"/>
+          <p:nvPr/>
+        </p:nvPicPr>
+        <p:blipFill>
+          <a:blip r:embed="rId3">
+            <a:alphaModFix/>
+          </a:blip>
+          <a:stretch>
+            <a:fillRect/>
+          </a:stretch>
+        </p:blipFill>
+        <p:spPr>
+          <a:xfrm>
+            <a:off y="1086800" x="229025"/>
+            <a:ext cy="4056700" cx="8685948"/>
+          </a:xfrm>
+          <a:prstGeom prst="rect">
+            <a:avLst/>
+          </a:prstGeom>
+          <a:noFill/>
+          <a:ln>
+            <a:noFill/>
+          </a:ln>
+        </p:spPr>
+      </p:pic>
+      <p:sp>
+        <p:nvSpPr>
+          <p:cNvPr id="102" name="Shape 102"/>
+          <p:cNvSpPr/>
+          <p:nvPr/>
+        </p:nvSpPr>
+        <p:spPr>
+          <a:xfrm flipH="1">
+            <a:off y="3811650" x="598375"/>
+            <a:ext cy="675899" cx="2163299"/>
+          </a:xfrm>
+          <a:prstGeom prst="wedgeRectCallout">
+            <a:avLst>
+              <a:gd fmla="val -64894" name="adj1"/>
+              <a:gd fmla="val 7596" name="adj2"/>
+            </a:avLst>
+          </a:prstGeom>
+          <a:solidFill>
+            <a:schemeClr val="lt2"/>
+          </a:solidFill>
+          <a:ln w="19050" cap="flat">
+            <a:solidFill>
+              <a:schemeClr val="dk2"/>
+            </a:solidFill>
+            <a:prstDash val="solid"/>
+            <a:round/>
+            <a:headEnd w="med" len="med" type="none"/>
+            <a:tailEnd w="med" len="med" type="none"/>
+          </a:ln>
+        </p:spPr>
+        <p:txBody>
+          <a:bodyPr bIns="91425" rIns="91425" lIns="91425" tIns="91425" anchor="ctr" anchorCtr="0">
+            <a:noAutofit/>
+          </a:bodyPr>
+          <a:lstStyle/>
+          <a:p>
+            <a:pPr>
+              <a:spcBef>
+                <a:spcPts val="0"/>
+              </a:spcBef>
+              <a:buNone/>
+            </a:pPr>
+            <a:r>
+              <a:t/>
+            </a:r>
+            <a:endParaRPr/>
+          </a:p>
+        </p:txBody>
+      </p:sp>
+      <p:sp>
+        <p:nvSpPr>
+          <p:cNvPr id="103" name="Shape 103"/>
           <p:cNvSpPr txBox="1"/>
           <p:nvPr/>
         </p:nvSpPr>
@@ -4529,12 +4778,12 @@
 </p:sld>
 </file>
 
-<file path=ppt/slides/slide11.xml><?xml version="1.0" encoding="utf-8"?>
+<file path=ppt/slides/slide12.xml><?xml version="1.0" encoding="utf-8"?>
 <p:sld xmlns:a="http://schemas.openxmlformats.org/drawingml/2006/main" xmlns:r="http://schemas.openxmlformats.org/officeDocument/2006/relationships" xmlns:mc="http://schemas.openxmlformats.org/markup-compatibility/2006" xmlns:mv="urn:schemas-microsoft-com:mac:vml" xmlns:p="http://schemas.openxmlformats.org/presentationml/2006/main" xmlns:c="http://schemas.openxmlformats.org/drawingml/2006/chart" xmlns:dgm="http://schemas.openxmlformats.org/drawingml/2006/diagram" xmlns:o="urn:schemas-microsoft-com:office:office" xmlns:v="urn:schemas-microsoft-com:vml" xmlns:pvml="urn:schemas-microsoft-com:office:powerpoint" xmlns:com="http://schemas.openxmlformats.org/drawingml/2006/compatibility" xmlns:p14="http://schemas.microsoft.com/office/powerpoint/2010/main">
   <p:cSld>
     <p:spTree>
       <p:nvGrpSpPr>
-        <p:cNvPr id="101" name="Shape 101"/>
+        <p:cNvPr id="107" name="Shape 107"/>
         <p:cNvGrpSpPr/>
         <p:nvPr/>
       </p:nvGrpSpPr>
@@ -4548,7 +4797,7 @@
       </p:grpSpPr>
       <p:pic>
         <p:nvPicPr>
-          <p:cNvPr id="102" name="Shape 102"/>
+          <p:cNvPr id="108" name="Shape 108"/>
           <p:cNvPicPr preferRelativeResize="0"/>
           <p:nvPr/>
         </p:nvPicPr>
@@ -4576,7 +4825,7 @@
       </p:pic>
       <p:grpSp>
         <p:nvGrpSpPr>
-          <p:cNvPr id="103" name="Shape 103"/>
+          <p:cNvPr id="109" name="Shape 109"/>
           <p:cNvGrpSpPr/>
           <p:nvPr/>
         </p:nvGrpSpPr>
@@ -4590,7 +4839,7 @@
         </p:grpSpPr>
         <p:sp>
           <p:nvSpPr>
-            <p:cNvPr id="104" name="Shape 104"/>
+            <p:cNvPr id="110" name="Shape 110"/>
             <p:cNvSpPr/>
             <p:nvPr/>
           </p:nvSpPr>
@@ -4639,7 +4888,7 @@
         </p:sp>
         <p:sp>
           <p:nvSpPr>
-            <p:cNvPr id="105" name="Shape 105"/>
+            <p:cNvPr id="111" name="Shape 111"/>
             <p:cNvSpPr txBox="1"/>
             <p:nvPr/>
           </p:nvSpPr>
@@ -4687,12 +4936,12 @@
 </p:sld>
 </file>
 
-<file path=ppt/slides/slide12.xml><?xml version="1.0" encoding="utf-8"?>
+<file path=ppt/slides/slide13.xml><?xml version="1.0" encoding="utf-8"?>
 <p:sld xmlns:a="http://schemas.openxmlformats.org/drawingml/2006/main" xmlns:r="http://schemas.openxmlformats.org/officeDocument/2006/relationships" xmlns:mc="http://schemas.openxmlformats.org/markup-compatibility/2006" xmlns:mv="urn:schemas-microsoft-com:mac:vml" xmlns:p="http://schemas.openxmlformats.org/presentationml/2006/main" xmlns:c="http://schemas.openxmlformats.org/drawingml/2006/chart" xmlns:dgm="http://schemas.openxmlformats.org/drawingml/2006/diagram" xmlns:o="urn:schemas-microsoft-com:office:office" xmlns:v="urn:schemas-microsoft-com:vml" xmlns:pvml="urn:schemas-microsoft-com:office:powerpoint" xmlns:com="http://schemas.openxmlformats.org/drawingml/2006/compatibility" xmlns:p14="http://schemas.microsoft.com/office/powerpoint/2010/main">
   <p:cSld>
     <p:spTree>
       <p:nvGrpSpPr>
-        <p:cNvPr id="109" name="Shape 109"/>
+        <p:cNvPr id="115" name="Shape 115"/>
         <p:cNvGrpSpPr/>
         <p:nvPr/>
       </p:nvGrpSpPr>
@@ -4706,7 +4955,7 @@
       </p:grpSpPr>
       <p:pic>
         <p:nvPicPr>
-          <p:cNvPr id="110" name="Shape 110"/>
+          <p:cNvPr id="116" name="Shape 116"/>
           <p:cNvPicPr preferRelativeResize="0"/>
           <p:nvPr/>
         </p:nvPicPr>
@@ -4734,7 +4983,7 @@
       </p:pic>
       <p:grpSp>
         <p:nvGrpSpPr>
-          <p:cNvPr id="111" name="Shape 111"/>
+          <p:cNvPr id="117" name="Shape 117"/>
           <p:cNvGrpSpPr/>
           <p:nvPr/>
         </p:nvGrpSpPr>
@@ -4748,7 +4997,7 @@
         </p:grpSpPr>
         <p:sp>
           <p:nvSpPr>
-            <p:cNvPr id="112" name="Shape 112"/>
+            <p:cNvPr id="118" name="Shape 118"/>
             <p:cNvSpPr/>
             <p:nvPr/>
           </p:nvSpPr>
@@ -4797,7 +5046,7 @@
         </p:sp>
         <p:sp>
           <p:nvSpPr>
-            <p:cNvPr id="113" name="Shape 113"/>
+            <p:cNvPr id="119" name="Shape 119"/>
             <p:cNvSpPr txBox="1"/>
             <p:nvPr/>
           </p:nvSpPr>
@@ -4845,12 +5094,12 @@
 </p:sld>
 </file>
 
-<file path=ppt/slides/slide13.xml><?xml version="1.0" encoding="utf-8"?>
+<file path=ppt/slides/slide14.xml><?xml version="1.0" encoding="utf-8"?>
 <p:sld xmlns:a="http://schemas.openxmlformats.org/drawingml/2006/main" xmlns:r="http://schemas.openxmlformats.org/officeDocument/2006/relationships" xmlns:mc="http://schemas.openxmlformats.org/markup-compatibility/2006" xmlns:mv="urn:schemas-microsoft-com:mac:vml" xmlns:p="http://schemas.openxmlformats.org/presentationml/2006/main" xmlns:c="http://schemas.openxmlformats.org/drawingml/2006/chart" xmlns:dgm="http://schemas.openxmlformats.org/drawingml/2006/diagram" xmlns:o="urn:schemas-microsoft-com:office:office" xmlns:v="urn:schemas-microsoft-com:vml" xmlns:pvml="urn:schemas-microsoft-com:office:powerpoint" xmlns:com="http://schemas.openxmlformats.org/drawingml/2006/compatibility" xmlns:p14="http://schemas.microsoft.com/office/powerpoint/2010/main">
   <p:cSld>
     <p:spTree>
       <p:nvGrpSpPr>
-        <p:cNvPr id="117" name="Shape 117"/>
+        <p:cNvPr id="123" name="Shape 123"/>
         <p:cNvGrpSpPr/>
         <p:nvPr/>
       </p:nvGrpSpPr>
@@ -4864,7 +5113,7 @@
       </p:grpSpPr>
       <p:pic>
         <p:nvPicPr>
-          <p:cNvPr id="118" name="Shape 118"/>
+          <p:cNvPr id="124" name="Shape 124"/>
           <p:cNvPicPr preferRelativeResize="0"/>
           <p:nvPr/>
         </p:nvPicPr>
@@ -4892,7 +5141,7 @@
       </p:pic>
       <p:grpSp>
         <p:nvGrpSpPr>
-          <p:cNvPr id="119" name="Shape 119"/>
+          <p:cNvPr id="125" name="Shape 125"/>
           <p:cNvGrpSpPr/>
           <p:nvPr/>
         </p:nvGrpSpPr>
@@ -4906,7 +5155,7 @@
         </p:grpSpPr>
         <p:sp>
           <p:nvSpPr>
-            <p:cNvPr id="120" name="Shape 120"/>
+            <p:cNvPr id="126" name="Shape 126"/>
             <p:cNvSpPr/>
             <p:nvPr/>
           </p:nvSpPr>
@@ -4955,7 +5204,7 @@
         </p:sp>
         <p:sp>
           <p:nvSpPr>
-            <p:cNvPr id="121" name="Shape 121"/>
+            <p:cNvPr id="127" name="Shape 127"/>
             <p:cNvSpPr txBox="1"/>
             <p:nvPr/>
           </p:nvSpPr>
@@ -5003,12 +5252,12 @@
 </p:sld>
 </file>
 
-<file path=ppt/slides/slide14.xml><?xml version="1.0" encoding="utf-8"?>
+<file path=ppt/slides/slide15.xml><?xml version="1.0" encoding="utf-8"?>
 <p:sld xmlns:a="http://schemas.openxmlformats.org/drawingml/2006/main" xmlns:r="http://schemas.openxmlformats.org/officeDocument/2006/relationships" xmlns:mc="http://schemas.openxmlformats.org/markup-compatibility/2006" xmlns:mv="urn:schemas-microsoft-com:mac:vml" xmlns:p="http://schemas.openxmlformats.org/presentationml/2006/main" xmlns:c="http://schemas.openxmlformats.org/drawingml/2006/chart" xmlns:dgm="http://schemas.openxmlformats.org/drawingml/2006/diagram" xmlns:o="urn:schemas-microsoft-com:office:office" xmlns:v="urn:schemas-microsoft-com:vml" xmlns:pvml="urn:schemas-microsoft-com:office:powerpoint" xmlns:com="http://schemas.openxmlformats.org/drawingml/2006/compatibility" xmlns:p14="http://schemas.microsoft.com/office/powerpoint/2010/main">
   <p:cSld>
     <p:spTree>
       <p:nvGrpSpPr>
-        <p:cNvPr id="125" name="Shape 125"/>
+        <p:cNvPr id="131" name="Shape 131"/>
         <p:cNvGrpSpPr/>
         <p:nvPr/>
       </p:nvGrpSpPr>
@@ -5022,7 +5271,7 @@
       </p:grpSpPr>
       <p:pic>
         <p:nvPicPr>
-          <p:cNvPr id="126" name="Shape 126"/>
+          <p:cNvPr id="132" name="Shape 132"/>
           <p:cNvPicPr preferRelativeResize="0"/>
           <p:nvPr/>
         </p:nvPicPr>
@@ -5050,7 +5299,7 @@
       </p:pic>
       <p:grpSp>
         <p:nvGrpSpPr>
-          <p:cNvPr id="127" name="Shape 127"/>
+          <p:cNvPr id="133" name="Shape 133"/>
           <p:cNvGrpSpPr/>
           <p:nvPr/>
         </p:nvGrpSpPr>
@@ -5064,7 +5313,7 @@
         </p:grpSpPr>
         <p:sp>
           <p:nvSpPr>
-            <p:cNvPr id="128" name="Shape 128"/>
+            <p:cNvPr id="134" name="Shape 134"/>
             <p:cNvSpPr/>
             <p:nvPr/>
           </p:nvSpPr>
@@ -5113,7 +5362,7 @@
         </p:sp>
         <p:sp>
           <p:nvSpPr>
-            <p:cNvPr id="129" name="Shape 129"/>
+            <p:cNvPr id="135" name="Shape 135"/>
             <p:cNvSpPr txBox="1"/>
             <p:nvPr/>
           </p:nvSpPr>
@@ -5161,12 +5410,12 @@
 </p:sld>
 </file>
 
-<file path=ppt/slides/slide15.xml><?xml version="1.0" encoding="utf-8"?>
+<file path=ppt/slides/slide16.xml><?xml version="1.0" encoding="utf-8"?>
 <p:sld xmlns:a="http://schemas.openxmlformats.org/drawingml/2006/main" xmlns:r="http://schemas.openxmlformats.org/officeDocument/2006/relationships" xmlns:mc="http://schemas.openxmlformats.org/markup-compatibility/2006" xmlns:mv="urn:schemas-microsoft-com:mac:vml" xmlns:p="http://schemas.openxmlformats.org/presentationml/2006/main" xmlns:c="http://schemas.openxmlformats.org/drawingml/2006/chart" xmlns:dgm="http://schemas.openxmlformats.org/drawingml/2006/diagram" xmlns:o="urn:schemas-microsoft-com:office:office" xmlns:v="urn:schemas-microsoft-com:vml" xmlns:pvml="urn:schemas-microsoft-com:office:powerpoint" xmlns:com="http://schemas.openxmlformats.org/drawingml/2006/compatibility" xmlns:p14="http://schemas.microsoft.com/office/powerpoint/2010/main">
   <p:cSld>
     <p:spTree>
       <p:nvGrpSpPr>
-        <p:cNvPr id="133" name="Shape 133"/>
+        <p:cNvPr id="139" name="Shape 139"/>
         <p:cNvGrpSpPr/>
         <p:nvPr/>
       </p:nvGrpSpPr>
@@ -5180,7 +5429,7 @@
       </p:grpSpPr>
       <p:pic>
         <p:nvPicPr>
-          <p:cNvPr id="134" name="Shape 134"/>
+          <p:cNvPr id="140" name="Shape 140"/>
           <p:cNvPicPr preferRelativeResize="0"/>
           <p:nvPr/>
         </p:nvPicPr>
@@ -5208,7 +5457,7 @@
       </p:pic>
       <p:grpSp>
         <p:nvGrpSpPr>
-          <p:cNvPr id="135" name="Shape 135"/>
+          <p:cNvPr id="141" name="Shape 141"/>
           <p:cNvGrpSpPr/>
           <p:nvPr/>
         </p:nvGrpSpPr>
@@ -5222,7 +5471,7 @@
         </p:grpSpPr>
         <p:sp>
           <p:nvSpPr>
-            <p:cNvPr id="136" name="Shape 136"/>
+            <p:cNvPr id="142" name="Shape 142"/>
             <p:cNvSpPr/>
             <p:nvPr/>
           </p:nvSpPr>
@@ -5271,7 +5520,7 @@
         </p:sp>
         <p:sp>
           <p:nvSpPr>
-            <p:cNvPr id="137" name="Shape 137"/>
+            <p:cNvPr id="143" name="Shape 143"/>
             <p:cNvSpPr txBox="1"/>
             <p:nvPr/>
           </p:nvSpPr>
@@ -5319,12 +5568,12 @@
 </p:sld>
 </file>
 
-<file path=ppt/slides/slide16.xml><?xml version="1.0" encoding="utf-8"?>
+<file path=ppt/slides/slide17.xml><?xml version="1.0" encoding="utf-8"?>
 <p:sld xmlns:a="http://schemas.openxmlformats.org/drawingml/2006/main" xmlns:r="http://schemas.openxmlformats.org/officeDocument/2006/relationships" xmlns:mc="http://schemas.openxmlformats.org/markup-compatibility/2006" xmlns:mv="urn:schemas-microsoft-com:mac:vml" xmlns:p="http://schemas.openxmlformats.org/presentationml/2006/main" xmlns:c="http://schemas.openxmlformats.org/drawingml/2006/chart" xmlns:dgm="http://schemas.openxmlformats.org/drawingml/2006/diagram" xmlns:o="urn:schemas-microsoft-com:office:office" xmlns:v="urn:schemas-microsoft-com:vml" xmlns:pvml="urn:schemas-microsoft-com:office:powerpoint" xmlns:com="http://schemas.openxmlformats.org/drawingml/2006/compatibility" xmlns:p14="http://schemas.microsoft.com/office/powerpoint/2010/main">
   <p:cSld>
     <p:spTree>
       <p:nvGrpSpPr>
-        <p:cNvPr id="141" name="Shape 141"/>
+        <p:cNvPr id="147" name="Shape 147"/>
         <p:cNvGrpSpPr/>
         <p:nvPr/>
       </p:nvGrpSpPr>
@@ -5338,7 +5587,7 @@
       </p:grpSpPr>
       <p:pic>
         <p:nvPicPr>
-          <p:cNvPr id="142" name="Shape 142"/>
+          <p:cNvPr id="148" name="Shape 148"/>
           <p:cNvPicPr preferRelativeResize="0"/>
           <p:nvPr/>
         </p:nvPicPr>
@@ -5366,7 +5615,7 @@
       </p:pic>
       <p:grpSp>
         <p:nvGrpSpPr>
-          <p:cNvPr id="143" name="Shape 143"/>
+          <p:cNvPr id="149" name="Shape 149"/>
           <p:cNvGrpSpPr/>
           <p:nvPr/>
         </p:nvGrpSpPr>
@@ -5380,7 +5629,7 @@
         </p:grpSpPr>
         <p:sp>
           <p:nvSpPr>
-            <p:cNvPr id="144" name="Shape 144"/>
+            <p:cNvPr id="150" name="Shape 150"/>
             <p:cNvSpPr/>
             <p:nvPr/>
           </p:nvSpPr>
@@ -5429,7 +5678,7 @@
         </p:sp>
         <p:sp>
           <p:nvSpPr>
-            <p:cNvPr id="145" name="Shape 145"/>
+            <p:cNvPr id="151" name="Shape 151"/>
             <p:cNvSpPr txBox="1"/>
             <p:nvPr/>
           </p:nvSpPr>
@@ -5477,12 +5726,12 @@
 </p:sld>
 </file>
 
-<file path=ppt/slides/slide17.xml><?xml version="1.0" encoding="utf-8"?>
+<file path=ppt/slides/slide18.xml><?xml version="1.0" encoding="utf-8"?>
 <p:sld xmlns:a="http://schemas.openxmlformats.org/drawingml/2006/main" xmlns:r="http://schemas.openxmlformats.org/officeDocument/2006/relationships" xmlns:mc="http://schemas.openxmlformats.org/markup-compatibility/2006" xmlns:mv="urn:schemas-microsoft-com:mac:vml" xmlns:p="http://schemas.openxmlformats.org/presentationml/2006/main" xmlns:c="http://schemas.openxmlformats.org/drawingml/2006/chart" xmlns:dgm="http://schemas.openxmlformats.org/drawingml/2006/diagram" xmlns:o="urn:schemas-microsoft-com:office:office" xmlns:v="urn:schemas-microsoft-com:vml" xmlns:pvml="urn:schemas-microsoft-com:office:powerpoint" xmlns:com="http://schemas.openxmlformats.org/drawingml/2006/compatibility" xmlns:p14="http://schemas.microsoft.com/office/powerpoint/2010/main">
   <p:cSld>
     <p:spTree>
       <p:nvGrpSpPr>
-        <p:cNvPr id="149" name="Shape 149"/>
+        <p:cNvPr id="155" name="Shape 155"/>
         <p:cNvGrpSpPr/>
         <p:nvPr/>
       </p:nvGrpSpPr>
@@ -5496,7 +5745,7 @@
       </p:grpSpPr>
       <p:sp>
         <p:nvSpPr>
-          <p:cNvPr id="150" name="Shape 150"/>
+          <p:cNvPr id="156" name="Shape 156"/>
           <p:cNvSpPr txBox="1"/>
           <p:nvPr/>
         </p:nvSpPr>
@@ -5686,8 +5935,8 @@
         </p:nvSpPr>
         <p:spPr>
           <a:xfrm>
-            <a:off y="3014750" x="2907450"/>
-            <a:ext cy="379799" cx="3329099"/>
+            <a:off y="3014750" x="1699200"/>
+            <a:ext cy="379799" cx="4537500"/>
           </a:xfrm>
           <a:prstGeom prst="rect">
             <a:avLst/>
@@ -5703,7 +5952,7 @@
           </a:bodyPr>
           <a:lstStyle/>
           <a:p>
-            <a:pPr algn="ctr" rtl="0" lvl="0">
+            <a:pPr rtl="0" lvl="0">
               <a:spcBef>
                 <a:spcPts val="0"/>
               </a:spcBef>
@@ -5959,7 +6208,7 @@
             </a:pPr>
             <a:r>
               <a:rPr b="1" sz="1800" lang="en"/>
-              <a:t>Stuff that we had trouble with</a:t>
+              <a:t>Things that we had trouble with</a:t>
             </a:r>
           </a:p>
         </p:txBody>
@@ -6002,7 +6251,24 @@
             </a:pPr>
             <a:r>
               <a:rPr lang="en"/>
-              <a:t>Time management (or lack thereof)</a:t>
+              <a:t>Time management</a:t>
+            </a:r>
+          </a:p>
+          <a:p>
+            <a:pPr rtl="0" lvl="0" indent="-317500" marL="457200">
+              <a:spcBef>
+                <a:spcPts val="1000"/>
+              </a:spcBef>
+              <a:buClr>
+                <a:srgbClr val="000000"/>
+              </a:buClr>
+              <a:buSzPct val="100000"/>
+              <a:buFont typeface="Arial"/>
+              <a:buChar char="●"/>
+            </a:pPr>
+            <a:r>
+              <a:rPr lang="en"/>
+              <a:t>Lack of Fantom documentation</a:t>
             </a:r>
           </a:p>
           <a:p>
@@ -6055,7 +6321,7 @@
         </p:nvSpPr>
         <p:spPr>
           <a:xfrm>
-            <a:off y="1277625" x="1699200"/>
+            <a:off y="1266125" x="1699200"/>
             <a:ext cy="379799" cx="4475999"/>
           </a:xfrm>
           <a:prstGeom prst="rect">
@@ -6080,7 +6346,7 @@
             </a:pPr>
             <a:r>
               <a:rPr b="1" sz="1800" lang="en"/>
-              <a:t>Tasks we completed</a:t>
+              <a:t>Technologies we used</a:t>
             </a:r>
           </a:p>
         </p:txBody>
@@ -6093,8 +6359,8 @@
         </p:nvSpPr>
         <p:spPr>
           <a:xfrm>
-            <a:off y="1657425" x="1699200"/>
-            <a:ext cy="3140700" cx="5745599"/>
+            <a:off y="1645925" x="1699200"/>
+            <a:ext cy="2600099" cx="5745599"/>
           </a:xfrm>
           <a:prstGeom prst="rect">
             <a:avLst/>
@@ -6123,7 +6389,7 @@
             </a:pPr>
             <a:r>
               <a:rPr lang="en"/>
-              <a:t>Full backend infrastructure for the system</a:t>
+              <a:t>Javascript</a:t>
             </a:r>
           </a:p>
           <a:p>
@@ -6140,7 +6406,7 @@
             </a:pPr>
             <a:r>
               <a:rPr lang="en"/>
-              <a:t>A state model that allows for easy navigation using the single page application paradigma</a:t>
+              <a:t>Fantom</a:t>
             </a:r>
           </a:p>
           <a:p>
@@ -6157,7 +6423,7 @@
             </a:pPr>
             <a:r>
               <a:rPr lang="en"/>
-              <a:t>A working database</a:t>
+              <a:t>Java</a:t>
             </a:r>
           </a:p>
           <a:p>
@@ -6174,7 +6440,7 @@
             </a:pPr>
             <a:r>
               <a:rPr lang="en"/>
-              <a:t>A Themes app that controls how the entire site is laid out and what colors and patterns are shown</a:t>
+              <a:t>F4 (IDE)</a:t>
             </a:r>
           </a:p>
           <a:p>
@@ -6191,7 +6457,7 @@
             </a:pPr>
             <a:r>
               <a:rPr lang="en"/>
-              <a:t>A users app that controls who has access to which apps</a:t>
+              <a:t>MongoDB</a:t>
             </a:r>
           </a:p>
           <a:p>
@@ -6207,13 +6473,21 @@
               <a:buChar char="●"/>
             </a:pPr>
             <a:r>
-              <a:rPr lang="en">
-                <a:solidFill>
-                  <a:schemeClr val="dk1"/>
-                </a:solidFill>
-              </a:rPr>
-              <a:t>A pages app that displays pages that have been statically stored in the database</a:t>
+              <a:rPr lang="en"/>
+              <a:t>GitHub</a:t>
             </a:r>
+          </a:p>
+          <a:p>
+            <a:pPr rtl="0" lvl="0">
+              <a:spcBef>
+                <a:spcPts val="0"/>
+              </a:spcBef>
+              <a:buNone/>
+            </a:pPr>
+            <a:r>
+              <a:t/>
+            </a:r>
+            <a:endParaRPr/>
           </a:p>
         </p:txBody>
       </p:sp>
@@ -6253,6 +6527,204 @@
         </p:nvSpPr>
         <p:spPr>
           <a:xfrm>
+            <a:off y="1277625" x="1699200"/>
+            <a:ext cy="379799" cx="4475999"/>
+          </a:xfrm>
+          <a:prstGeom prst="rect">
+            <a:avLst/>
+          </a:prstGeom>
+          <a:noFill/>
+          <a:ln>
+            <a:noFill/>
+          </a:ln>
+        </p:spPr>
+        <p:txBody>
+          <a:bodyPr bIns="91425" rIns="91425" lIns="91425" tIns="91425" anchor="t" anchorCtr="0">
+            <a:noAutofit/>
+          </a:bodyPr>
+          <a:lstStyle/>
+          <a:p>
+            <a:pPr rtl="0" lvl="0">
+              <a:spcBef>
+                <a:spcPts val="0"/>
+              </a:spcBef>
+              <a:buNone/>
+            </a:pPr>
+            <a:r>
+              <a:rPr b="1" sz="1800" lang="en"/>
+              <a:t>Tasks we completed</a:t>
+            </a:r>
+          </a:p>
+        </p:txBody>
+      </p:sp>
+      <p:sp>
+        <p:nvSpPr>
+          <p:cNvPr id="56" name="Shape 56"/>
+          <p:cNvSpPr txBox="1"/>
+          <p:nvPr/>
+        </p:nvSpPr>
+        <p:spPr>
+          <a:xfrm>
+            <a:off y="1657425" x="1699200"/>
+            <a:ext cy="3140700" cx="5745599"/>
+          </a:xfrm>
+          <a:prstGeom prst="rect">
+            <a:avLst/>
+          </a:prstGeom>
+          <a:noFill/>
+          <a:ln>
+            <a:noFill/>
+          </a:ln>
+        </p:spPr>
+        <p:txBody>
+          <a:bodyPr bIns="91425" rIns="91425" lIns="91425" tIns="91425" anchor="t" anchorCtr="0">
+            <a:noAutofit/>
+          </a:bodyPr>
+          <a:lstStyle/>
+          <a:p>
+            <a:pPr rtl="0" lvl="0" indent="-317500" marL="457200">
+              <a:spcBef>
+                <a:spcPts val="1000"/>
+              </a:spcBef>
+              <a:buClr>
+                <a:srgbClr val="000000"/>
+              </a:buClr>
+              <a:buSzPct val="100000"/>
+              <a:buFont typeface="Arial"/>
+              <a:buChar char="●"/>
+            </a:pPr>
+            <a:r>
+              <a:rPr lang="en"/>
+              <a:t>Full backend infrastructure for the system</a:t>
+            </a:r>
+          </a:p>
+          <a:p>
+            <a:pPr rtl="0" lvl="0" indent="-317500" marL="457200">
+              <a:spcBef>
+                <a:spcPts val="1000"/>
+              </a:spcBef>
+              <a:buClr>
+                <a:srgbClr val="000000"/>
+              </a:buClr>
+              <a:buSzPct val="100000"/>
+              <a:buFont typeface="Arial"/>
+              <a:buChar char="●"/>
+            </a:pPr>
+            <a:r>
+              <a:rPr lang="en"/>
+              <a:t>A state model that allows for easy navigation using the single page application paradigm</a:t>
+            </a:r>
+          </a:p>
+          <a:p>
+            <a:pPr rtl="0" lvl="0" indent="-317500" marL="457200">
+              <a:spcBef>
+                <a:spcPts val="1000"/>
+              </a:spcBef>
+              <a:buClr>
+                <a:srgbClr val="000000"/>
+              </a:buClr>
+              <a:buSzPct val="100000"/>
+              <a:buFont typeface="Arial"/>
+              <a:buChar char="●"/>
+            </a:pPr>
+            <a:r>
+              <a:rPr lang="en"/>
+              <a:t>A working database</a:t>
+            </a:r>
+          </a:p>
+          <a:p>
+            <a:pPr rtl="0" lvl="0" indent="-317500" marL="457200">
+              <a:spcBef>
+                <a:spcPts val="1000"/>
+              </a:spcBef>
+              <a:buClr>
+                <a:srgbClr val="000000"/>
+              </a:buClr>
+              <a:buSzPct val="100000"/>
+              <a:buFont typeface="Arial"/>
+              <a:buChar char="●"/>
+            </a:pPr>
+            <a:r>
+              <a:rPr lang="en"/>
+              <a:t>A themes app that controls how the entire site is laid out and what colors and patterns are shown</a:t>
+            </a:r>
+          </a:p>
+          <a:p>
+            <a:pPr rtl="0" lvl="0" indent="-317500" marL="457200">
+              <a:spcBef>
+                <a:spcPts val="1000"/>
+              </a:spcBef>
+              <a:buClr>
+                <a:srgbClr val="000000"/>
+              </a:buClr>
+              <a:buSzPct val="100000"/>
+              <a:buFont typeface="Arial"/>
+              <a:buChar char="●"/>
+            </a:pPr>
+            <a:r>
+              <a:rPr lang="en"/>
+              <a:t>A users app that controls who has access to which apps</a:t>
+            </a:r>
+          </a:p>
+          <a:p>
+            <a:pPr rtl="0" lvl="0" indent="-317500" marL="457200">
+              <a:spcBef>
+                <a:spcPts val="1000"/>
+              </a:spcBef>
+              <a:buClr>
+                <a:srgbClr val="000000"/>
+              </a:buClr>
+              <a:buSzPct val="100000"/>
+              <a:buFont typeface="Arial"/>
+              <a:buChar char="●"/>
+            </a:pPr>
+            <a:r>
+              <a:rPr lang="en">
+                <a:solidFill>
+                  <a:schemeClr val="dk1"/>
+                </a:solidFill>
+              </a:rPr>
+              <a:t>A pages app that displays pages that have been statically stored in the database</a:t>
+            </a:r>
+          </a:p>
+        </p:txBody>
+      </p:sp>
+    </p:spTree>
+  </p:cSld>
+  <p:clrMapOvr>
+    <a:masterClrMapping/>
+  </p:clrMapOvr>
+  <p:transition spd="slow">
+    <p:cut/>
+  </p:transition>
+</p:sld>
+</file>
+
+<file path=ppt/slides/slide6.xml><?xml version="1.0" encoding="utf-8"?>
+<p:sld xmlns:a="http://schemas.openxmlformats.org/drawingml/2006/main" xmlns:r="http://schemas.openxmlformats.org/officeDocument/2006/relationships" xmlns:mc="http://schemas.openxmlformats.org/markup-compatibility/2006" xmlns:mv="urn:schemas-microsoft-com:mac:vml" xmlns:p="http://schemas.openxmlformats.org/presentationml/2006/main" xmlns:c="http://schemas.openxmlformats.org/drawingml/2006/chart" xmlns:dgm="http://schemas.openxmlformats.org/drawingml/2006/diagram" xmlns:o="urn:schemas-microsoft-com:office:office" xmlns:v="urn:schemas-microsoft-com:vml" xmlns:pvml="urn:schemas-microsoft-com:office:powerpoint" xmlns:com="http://schemas.openxmlformats.org/drawingml/2006/compatibility" xmlns:p14="http://schemas.microsoft.com/office/powerpoint/2010/main">
+  <p:cSld>
+    <p:spTree>
+      <p:nvGrpSpPr>
+        <p:cNvPr id="60" name="Shape 60"/>
+        <p:cNvGrpSpPr/>
+        <p:nvPr/>
+      </p:nvGrpSpPr>
+      <p:grpSpPr>
+        <a:xfrm>
+          <a:off y="0" x="0"/>
+          <a:ext cy="0" cx="0"/>
+          <a:chOff y="0" x="0"/>
+          <a:chExt cy="0" cx="0"/>
+        </a:xfrm>
+      </p:grpSpPr>
+      <p:sp>
+        <p:nvSpPr>
+          <p:cNvPr id="61" name="Shape 61"/>
+          <p:cNvSpPr txBox="1"/>
+          <p:nvPr/>
+        </p:nvSpPr>
+        <p:spPr>
+          <a:xfrm>
             <a:off y="1266125" x="1699200"/>
             <a:ext cy="379799" cx="5110800"/>
           </a:xfrm>
@@ -6285,7 +6757,7 @@
       </p:sp>
       <p:sp>
         <p:nvSpPr>
-          <p:cNvPr id="56" name="Shape 56"/>
+          <p:cNvPr id="62" name="Shape 62"/>
           <p:cNvSpPr txBox="1"/>
           <p:nvPr/>
         </p:nvSpPr>
@@ -6338,7 +6810,15 @@
             </a:pPr>
             <a:r>
               <a:rPr lang="en"/>
-              <a:t>A gallery app that displays images</a:t>
+              <a:t>A gallery app </a:t>
+            </a:r>
+            <a:r>
+              <a:rPr lang="en">
+                <a:solidFill>
+                  <a:schemeClr val="dk1"/>
+                </a:solidFill>
+              </a:rPr>
+              <a:t>for viewing multimedia on the site</a:t>
             </a:r>
           </a:p>
           <a:p>
@@ -6355,14 +6835,14 @@
             </a:pPr>
             <a:r>
               <a:rPr lang="en"/>
-              <a:t>An Audio app that can play music from the database</a:t>
+              <a:t>An audio extension that can play music from the database</a:t>
             </a:r>
           </a:p>
         </p:txBody>
       </p:sp>
       <p:grpSp>
         <p:nvGrpSpPr>
-          <p:cNvPr id="57" name="Shape 57"/>
+          <p:cNvPr id="63" name="Shape 63"/>
           <p:cNvGrpSpPr/>
           <p:nvPr/>
         </p:nvGrpSpPr>
@@ -6376,7 +6856,7 @@
         </p:grpSpPr>
         <p:sp>
           <p:nvSpPr>
-            <p:cNvPr id="58" name="Shape 58"/>
+            <p:cNvPr id="64" name="Shape 64"/>
             <p:cNvSpPr txBox="1"/>
             <p:nvPr/>
           </p:nvSpPr>
@@ -6414,7 +6894,7 @@
         </p:sp>
         <p:sp>
           <p:nvSpPr>
-            <p:cNvPr id="59" name="Shape 59"/>
+            <p:cNvPr id="65" name="Shape 65"/>
             <p:cNvSpPr/>
             <p:nvPr/>
           </p:nvSpPr>
@@ -6502,7 +6982,7 @@
                                           </p:stCondLst>
                                         </p:cTn>
                                         <p:tgtEl>
-                                          <p:spTgt spid="57"/>
+                                          <p:spTgt spid="63"/>
                                         </p:tgtEl>
                                         <p:attrNameLst>
                                           <p:attrName>style.visibility</p:attrName>
@@ -6516,7 +6996,7 @@
                                       <p:cBhvr additive="base">
                                         <p:cTn dur="1000"/>
                                         <p:tgtEl>
-                                          <p:spTgt spid="57"/>
+                                          <p:spTgt spid="63"/>
                                         </p:tgtEl>
                                         <p:attrNameLst>
                                           <p:attrName>ppt_x</p:attrName>
@@ -6569,12 +7049,12 @@
 </p:sld>
 </file>
 
-<file path=ppt/slides/slide6.xml><?xml version="1.0" encoding="utf-8"?>
+<file path=ppt/slides/slide7.xml><?xml version="1.0" encoding="utf-8"?>
 <p:sld xmlns:a="http://schemas.openxmlformats.org/drawingml/2006/main" xmlns:r="http://schemas.openxmlformats.org/officeDocument/2006/relationships" xmlns:mc="http://schemas.openxmlformats.org/markup-compatibility/2006" xmlns:mv="urn:schemas-microsoft-com:mac:vml" xmlns:p="http://schemas.openxmlformats.org/presentationml/2006/main" xmlns:c="http://schemas.openxmlformats.org/drawingml/2006/chart" xmlns:dgm="http://schemas.openxmlformats.org/drawingml/2006/diagram" xmlns:o="urn:schemas-microsoft-com:office:office" xmlns:v="urn:schemas-microsoft-com:vml" xmlns:pvml="urn:schemas-microsoft-com:office:powerpoint" xmlns:com="http://schemas.openxmlformats.org/drawingml/2006/compatibility" xmlns:p14="http://schemas.microsoft.com/office/powerpoint/2010/main">
   <p:cSld>
     <p:spTree>
       <p:nvGrpSpPr>
-        <p:cNvPr id="63" name="Shape 63"/>
+        <p:cNvPr id="69" name="Shape 69"/>
         <p:cNvGrpSpPr/>
         <p:nvPr/>
       </p:nvGrpSpPr>
@@ -6588,7 +7068,7 @@
       </p:grpSpPr>
       <p:pic>
         <p:nvPicPr>
-          <p:cNvPr id="64" name="Shape 64"/>
+          <p:cNvPr id="70" name="Shape 70"/>
           <p:cNvPicPr preferRelativeResize="0"/>
           <p:nvPr/>
         </p:nvPicPr>
@@ -6616,7 +7096,7 @@
       </p:pic>
       <p:grpSp>
         <p:nvGrpSpPr>
-          <p:cNvPr id="65" name="Shape 65"/>
+          <p:cNvPr id="71" name="Shape 71"/>
           <p:cNvGrpSpPr/>
           <p:nvPr/>
         </p:nvGrpSpPr>
@@ -6630,7 +7110,7 @@
         </p:grpSpPr>
         <p:sp>
           <p:nvSpPr>
-            <p:cNvPr id="66" name="Shape 66"/>
+            <p:cNvPr id="72" name="Shape 72"/>
             <p:cNvSpPr/>
             <p:nvPr/>
           </p:nvSpPr>
@@ -6679,7 +7159,7 @@
         </p:sp>
         <p:sp>
           <p:nvSpPr>
-            <p:cNvPr id="67" name="Shape 67"/>
+            <p:cNvPr id="73" name="Shape 73"/>
             <p:cNvSpPr txBox="1"/>
             <p:nvPr/>
           </p:nvSpPr>
@@ -6727,12 +7207,12 @@
 </p:sld>
 </file>
 
-<file path=ppt/slides/slide7.xml><?xml version="1.0" encoding="utf-8"?>
+<file path=ppt/slides/slide8.xml><?xml version="1.0" encoding="utf-8"?>
 <p:sld xmlns:a="http://schemas.openxmlformats.org/drawingml/2006/main" xmlns:r="http://schemas.openxmlformats.org/officeDocument/2006/relationships" xmlns:mc="http://schemas.openxmlformats.org/markup-compatibility/2006" xmlns:mv="urn:schemas-microsoft-com:mac:vml" xmlns:p="http://schemas.openxmlformats.org/presentationml/2006/main" xmlns:c="http://schemas.openxmlformats.org/drawingml/2006/chart" xmlns:dgm="http://schemas.openxmlformats.org/drawingml/2006/diagram" xmlns:o="urn:schemas-microsoft-com:office:office" xmlns:v="urn:schemas-microsoft-com:vml" xmlns:pvml="urn:schemas-microsoft-com:office:powerpoint" xmlns:com="http://schemas.openxmlformats.org/drawingml/2006/compatibility" xmlns:p14="http://schemas.microsoft.com/office/powerpoint/2010/main">
   <p:cSld>
     <p:spTree>
       <p:nvGrpSpPr>
-        <p:cNvPr id="71" name="Shape 71"/>
+        <p:cNvPr id="77" name="Shape 77"/>
         <p:cNvGrpSpPr/>
         <p:nvPr/>
       </p:nvGrpSpPr>
@@ -6746,7 +7226,7 @@
       </p:grpSpPr>
       <p:pic>
         <p:nvPicPr>
-          <p:cNvPr id="72" name="Shape 72"/>
+          <p:cNvPr id="78" name="Shape 78"/>
           <p:cNvPicPr preferRelativeResize="0"/>
           <p:nvPr/>
         </p:nvPicPr>
@@ -6774,7 +7254,7 @@
       </p:pic>
       <p:grpSp>
         <p:nvGrpSpPr>
-          <p:cNvPr id="73" name="Shape 73"/>
+          <p:cNvPr id="79" name="Shape 79"/>
           <p:cNvGrpSpPr/>
           <p:nvPr/>
         </p:nvGrpSpPr>
@@ -6788,7 +7268,7 @@
         </p:grpSpPr>
         <p:sp>
           <p:nvSpPr>
-            <p:cNvPr id="74" name="Shape 74"/>
+            <p:cNvPr id="80" name="Shape 80"/>
             <p:cNvSpPr/>
             <p:nvPr/>
           </p:nvSpPr>
@@ -6837,7 +7317,7 @@
         </p:sp>
         <p:sp>
           <p:nvSpPr>
-            <p:cNvPr id="75" name="Shape 75"/>
+            <p:cNvPr id="81" name="Shape 81"/>
             <p:cNvSpPr txBox="1"/>
             <p:nvPr/>
           </p:nvSpPr>
@@ -6885,12 +7365,12 @@
 </p:sld>
 </file>
 
-<file path=ppt/slides/slide8.xml><?xml version="1.0" encoding="utf-8"?>
+<file path=ppt/slides/slide9.xml><?xml version="1.0" encoding="utf-8"?>
 <p:sld xmlns:a="http://schemas.openxmlformats.org/drawingml/2006/main" xmlns:r="http://schemas.openxmlformats.org/officeDocument/2006/relationships" xmlns:mc="http://schemas.openxmlformats.org/markup-compatibility/2006" xmlns:mv="urn:schemas-microsoft-com:mac:vml" xmlns:p="http://schemas.openxmlformats.org/presentationml/2006/main" xmlns:c="http://schemas.openxmlformats.org/drawingml/2006/chart" xmlns:dgm="http://schemas.openxmlformats.org/drawingml/2006/diagram" xmlns:o="urn:schemas-microsoft-com:office:office" xmlns:v="urn:schemas-microsoft-com:vml" xmlns:pvml="urn:schemas-microsoft-com:office:powerpoint" xmlns:com="http://schemas.openxmlformats.org/drawingml/2006/compatibility" xmlns:p14="http://schemas.microsoft.com/office/powerpoint/2010/main">
   <p:cSld>
     <p:spTree>
       <p:nvGrpSpPr>
-        <p:cNvPr id="79" name="Shape 79"/>
+        <p:cNvPr id="85" name="Shape 85"/>
         <p:cNvGrpSpPr/>
         <p:nvPr/>
       </p:nvGrpSpPr>
@@ -6904,7 +7384,7 @@
       </p:grpSpPr>
       <p:pic>
         <p:nvPicPr>
-          <p:cNvPr id="80" name="Shape 80"/>
+          <p:cNvPr id="86" name="Shape 86"/>
           <p:cNvPicPr preferRelativeResize="0"/>
           <p:nvPr/>
         </p:nvPicPr>
@@ -6932,7 +7412,7 @@
       </p:pic>
       <p:grpSp>
         <p:nvGrpSpPr>
-          <p:cNvPr id="81" name="Shape 81"/>
+          <p:cNvPr id="87" name="Shape 87"/>
           <p:cNvGrpSpPr/>
           <p:nvPr/>
         </p:nvGrpSpPr>
@@ -6946,7 +7426,7 @@
         </p:grpSpPr>
         <p:sp>
           <p:nvSpPr>
-            <p:cNvPr id="82" name="Shape 82"/>
+            <p:cNvPr id="88" name="Shape 88"/>
             <p:cNvSpPr/>
             <p:nvPr/>
           </p:nvSpPr>
@@ -6995,7 +7475,7 @@
         </p:sp>
         <p:sp>
           <p:nvSpPr>
-            <p:cNvPr id="83" name="Shape 83"/>
+            <p:cNvPr id="89" name="Shape 89"/>
             <p:cNvSpPr txBox="1"/>
             <p:nvPr/>
           </p:nvSpPr>
@@ -7032,149 +7512,6 @@
           </p:txBody>
         </p:sp>
       </p:grpSp>
-    </p:spTree>
-  </p:cSld>
-  <p:clrMapOvr>
-    <a:masterClrMapping/>
-  </p:clrMapOvr>
-  <p:transition spd="slow">
-    <p:cut/>
-  </p:transition>
-</p:sld>
-</file>
-
-<file path=ppt/slides/slide9.xml><?xml version="1.0" encoding="utf-8"?>
-<p:sld xmlns:a="http://schemas.openxmlformats.org/drawingml/2006/main" xmlns:r="http://schemas.openxmlformats.org/officeDocument/2006/relationships" xmlns:mc="http://schemas.openxmlformats.org/markup-compatibility/2006" xmlns:mv="urn:schemas-microsoft-com:mac:vml" xmlns:p="http://schemas.openxmlformats.org/presentationml/2006/main" xmlns:c="http://schemas.openxmlformats.org/drawingml/2006/chart" xmlns:dgm="http://schemas.openxmlformats.org/drawingml/2006/diagram" xmlns:o="urn:schemas-microsoft-com:office:office" xmlns:v="urn:schemas-microsoft-com:vml" xmlns:pvml="urn:schemas-microsoft-com:office:powerpoint" xmlns:com="http://schemas.openxmlformats.org/drawingml/2006/compatibility" xmlns:p14="http://schemas.microsoft.com/office/powerpoint/2010/main">
-  <p:cSld>
-    <p:spTree>
-      <p:nvGrpSpPr>
-        <p:cNvPr id="87" name="Shape 87"/>
-        <p:cNvGrpSpPr/>
-        <p:nvPr/>
-      </p:nvGrpSpPr>
-      <p:grpSpPr>
-        <a:xfrm>
-          <a:off y="0" x="0"/>
-          <a:ext cy="0" cx="0"/>
-          <a:chOff y="0" x="0"/>
-          <a:chExt cy="0" cx="0"/>
-        </a:xfrm>
-      </p:grpSpPr>
-      <p:pic>
-        <p:nvPicPr>
-          <p:cNvPr id="88" name="Shape 88"/>
-          <p:cNvPicPr preferRelativeResize="0"/>
-          <p:nvPr/>
-        </p:nvPicPr>
-        <p:blipFill>
-          <a:blip r:embed="rId3">
-            <a:alphaModFix/>
-          </a:blip>
-          <a:stretch>
-            <a:fillRect/>
-          </a:stretch>
-        </p:blipFill>
-        <p:spPr>
-          <a:xfrm>
-            <a:off y="1124925" x="229025"/>
-            <a:ext cy="4098099" cx="8685948"/>
-          </a:xfrm>
-          <a:prstGeom prst="rect">
-            <a:avLst/>
-          </a:prstGeom>
-          <a:noFill/>
-          <a:ln>
-            <a:noFill/>
-          </a:ln>
-        </p:spPr>
-      </p:pic>
-      <p:sp>
-        <p:nvSpPr>
-          <p:cNvPr id="89" name="Shape 89"/>
-          <p:cNvSpPr/>
-          <p:nvPr/>
-        </p:nvSpPr>
-        <p:spPr>
-          <a:xfrm flipH="1">
-            <a:off y="1636875" x="4165450"/>
-            <a:ext cy="1005899" cx="2163299"/>
-          </a:xfrm>
-          <a:prstGeom prst="wedgeRectCallout">
-            <a:avLst>
-              <a:gd fmla="val -64894" name="adj1"/>
-              <a:gd fmla="val 7596" name="adj2"/>
-            </a:avLst>
-          </a:prstGeom>
-          <a:solidFill>
-            <a:schemeClr val="lt2"/>
-          </a:solidFill>
-          <a:ln w="19050" cap="flat">
-            <a:solidFill>
-              <a:schemeClr val="dk2"/>
-            </a:solidFill>
-            <a:prstDash val="solid"/>
-            <a:round/>
-            <a:headEnd w="med" len="med" type="none"/>
-            <a:tailEnd w="med" len="med" type="none"/>
-          </a:ln>
-        </p:spPr>
-        <p:txBody>
-          <a:bodyPr bIns="91425" rIns="91425" lIns="91425" tIns="91425" anchor="ctr" anchorCtr="0">
-            <a:noAutofit/>
-          </a:bodyPr>
-          <a:lstStyle/>
-          <a:p>
-            <a:pPr>
-              <a:spcBef>
-                <a:spcPts val="0"/>
-              </a:spcBef>
-              <a:buNone/>
-            </a:pPr>
-            <a:r>
-              <a:t/>
-            </a:r>
-            <a:endParaRPr/>
-          </a:p>
-        </p:txBody>
-      </p:sp>
-      <p:sp>
-        <p:nvSpPr>
-          <p:cNvPr id="90" name="Shape 90"/>
-          <p:cNvSpPr txBox="1"/>
-          <p:nvPr/>
-        </p:nvSpPr>
-        <p:spPr>
-          <a:xfrm>
-            <a:off y="1636875" x="4165450"/>
-            <a:ext cy="1005899" cx="2163299"/>
-          </a:xfrm>
-          <a:prstGeom prst="rect">
-            <a:avLst/>
-          </a:prstGeom>
-          <a:noFill/>
-          <a:ln>
-            <a:noFill/>
-          </a:ln>
-        </p:spPr>
-        <p:txBody>
-          <a:bodyPr bIns="91425" rIns="91425" lIns="91425" tIns="91425" anchor="t" anchorCtr="0">
-            <a:noAutofit/>
-          </a:bodyPr>
-          <a:lstStyle/>
-          <a:p>
-            <a:pPr rtl="0" lvl="0">
-              <a:spcBef>
-                <a:spcPts val="0"/>
-              </a:spcBef>
-              <a:buNone/>
-            </a:pPr>
-            <a:r>
-              <a:rPr lang="en"/>
-              <a:t>Login bar.  Without logging in you have access to a limited number of apps</a:t>
-            </a:r>
-          </a:p>
-        </p:txBody>
-      </p:sp>
     </p:spTree>
   </p:cSld>
   <p:clrMapOvr>
@@ -7504,6 +7841,283 @@
 </file>
 
 <file path=ppt/theme/theme2.xml><?xml version="1.0" encoding="utf-8"?>
+<a:theme xmlns:a="http://schemas.openxmlformats.org/drawingml/2006/main" xmlns:r="http://schemas.openxmlformats.org/officeDocument/2006/relationships" name="Custom Theme">
+  <a:themeElements>
+    <a:clrScheme name="Default">
+      <a:dk1>
+        <a:srgbClr val="000000"/>
+      </a:dk1>
+      <a:lt1>
+        <a:srgbClr val="FFFFFF"/>
+      </a:lt1>
+      <a:dk2>
+        <a:srgbClr val="158158"/>
+      </a:dk2>
+      <a:lt2>
+        <a:srgbClr val="F3F3F3"/>
+      </a:lt2>
+      <a:accent1>
+        <a:srgbClr val="058DC7"/>
+      </a:accent1>
+      <a:accent2>
+        <a:srgbClr val="50B432"/>
+      </a:accent2>
+      <a:accent3>
+        <a:srgbClr val="ED561B"/>
+      </a:accent3>
+      <a:accent4>
+        <a:srgbClr val="EDEF00"/>
+      </a:accent4>
+      <a:accent5>
+        <a:srgbClr val="24CBE5"/>
+      </a:accent5>
+      <a:accent6>
+        <a:srgbClr val="64E572"/>
+      </a:accent6>
+      <a:hlink>
+        <a:srgbClr val="2200CC"/>
+      </a:hlink>
+      <a:folHlink>
+        <a:srgbClr val="551A8B"/>
+      </a:folHlink>
+    </a:clrScheme>
+    <a:fontScheme name="Office">
+      <a:majorFont>
+        <a:latin typeface="Arial"/>
+        <a:ea typeface=""/>
+        <a:cs typeface=""/>
+        <a:font typeface="ＭＳ Ｐゴシック" script="Jpan"/>
+        <a:font typeface="맑은 고딕" script="Hang"/>
+        <a:font typeface="宋体" script="Hans"/>
+        <a:font typeface="新細明體" script="Hant"/>
+        <a:font typeface="Times New Roman" script="Arab"/>
+        <a:font typeface="Times New Roman" script="Hebr"/>
+        <a:font typeface="Angsana New" script="Thai"/>
+        <a:font typeface="Nyala" script="Ethi"/>
+        <a:font typeface="Vrinda" script="Beng"/>
+        <a:font typeface="Shruti" script="Gujr"/>
+        <a:font typeface="MoolBoran" script="Khmr"/>
+        <a:font typeface="Tunga" script="Knda"/>
+        <a:font typeface="Raavi" script="Guru"/>
+        <a:font typeface="Euphemia" script="Cans"/>
+        <a:font typeface="Plantagenet Cherokee" script="Cher"/>
+        <a:font typeface="Microsoft Yi Baiti" script="Yiii"/>
+        <a:font typeface="Microsoft Himalaya" script="Tibt"/>
+        <a:font typeface="MV Boli" script="Thaa"/>
+        <a:font typeface="Mangal" script="Deva"/>
+        <a:font typeface="Gautami" script="Telu"/>
+        <a:font typeface="Latha" script="Taml"/>
+        <a:font typeface="Estrangelo Edessa" script="Syrc"/>
+        <a:font typeface="Kalinga" script="Orya"/>
+        <a:font typeface="Kartika" script="Mlym"/>
+        <a:font typeface="DokChampa" script="Laoo"/>
+        <a:font typeface="Iskoola Pota" script="Sinh"/>
+        <a:font typeface="Mongolian Baiti" script="Mong"/>
+        <a:font typeface="Times New Roman" script="Viet"/>
+        <a:font typeface="Microsoft Uighur" script="Uigh"/>
+      </a:majorFont>
+      <a:minorFont>
+        <a:latin typeface="Arial"/>
+        <a:ea typeface=""/>
+        <a:cs typeface=""/>
+        <a:font typeface="ＭＳ Ｐゴシック" script="Jpan"/>
+        <a:font typeface="맑은 고딕" script="Hang"/>
+        <a:font typeface="宋体" script="Hans"/>
+        <a:font typeface="新細明體" script="Hant"/>
+        <a:font typeface="Times New Roman" script="Arab"/>
+        <a:font typeface="Times New Roman" script="Hebr"/>
+        <a:font typeface="Angsana New" script="Thai"/>
+        <a:font typeface="Nyala" script="Ethi"/>
+        <a:font typeface="Vrinda" script="Beng"/>
+        <a:font typeface="Shruti" script="Gujr"/>
+        <a:font typeface="MoolBoran" script="Khmr"/>
+        <a:font typeface="Tunga" script="Knda"/>
+        <a:font typeface="Raavi" script="Guru"/>
+        <a:font typeface="Euphemia" script="Cans"/>
+        <a:font typeface="Plantagenet Cherokee" script="Cher"/>
+        <a:font typeface="Microsoft Yi Baiti" script="Yiii"/>
+        <a:font typeface="Microsoft Himalaya" script="Tibt"/>
+        <a:font typeface="MV Boli" script="Thaa"/>
+        <a:font typeface="Mangal" script="Deva"/>
+        <a:font typeface="Gautami" script="Telu"/>
+        <a:font typeface="Latha" script="Taml"/>
+        <a:font typeface="Estrangelo Edessa" script="Syrc"/>
+        <a:font typeface="Kalinga" script="Orya"/>
+        <a:font typeface="Kartika" script="Mlym"/>
+        <a:font typeface="DokChampa" script="Laoo"/>
+        <a:font typeface="Iskoola Pota" script="Sinh"/>
+        <a:font typeface="Mongolian Baiti" script="Mong"/>
+        <a:font typeface="Times New Roman" script="Viet"/>
+        <a:font typeface="Microsoft Uighur" script="Uigh"/>
+      </a:minorFont>
+    </a:fontScheme>
+    <a:fmtScheme name="Office">
+      <a:fillStyleLst>
+        <a:solidFill>
+          <a:schemeClr val="phClr"/>
+        </a:solidFill>
+        <a:gradFill rotWithShape="1">
+          <a:gsLst>
+            <a:gs pos="0">
+              <a:schemeClr val="phClr">
+                <a:tint val="50000"/>
+                <a:satMod val="300000"/>
+              </a:schemeClr>
+            </a:gs>
+            <a:gs pos="35000">
+              <a:schemeClr val="phClr">
+                <a:tint val="37000"/>
+                <a:satMod val="300000"/>
+              </a:schemeClr>
+            </a:gs>
+            <a:gs pos="100000">
+              <a:schemeClr val="phClr">
+                <a:tint val="15000"/>
+                <a:satMod val="350000"/>
+              </a:schemeClr>
+            </a:gs>
+          </a:gsLst>
+          <a:lin ang="16200000" scaled="1"/>
+        </a:gradFill>
+        <a:gradFill rotWithShape="1">
+          <a:gsLst>
+            <a:gs pos="0">
+              <a:schemeClr val="phClr">
+                <a:tint val="100000"/>
+                <a:shade val="100000"/>
+                <a:satMod val="130000"/>
+              </a:schemeClr>
+            </a:gs>
+            <a:gs pos="100000">
+              <a:schemeClr val="phClr">
+                <a:tint val="50000"/>
+                <a:shade val="100000"/>
+                <a:satMod val="350000"/>
+              </a:schemeClr>
+            </a:gs>
+          </a:gsLst>
+          <a:lin ang="16200000" scaled="0"/>
+        </a:gradFill>
+      </a:fillStyleLst>
+      <a:lnStyleLst>
+        <a:ln w="9525" algn="ctr" cap="flat" cmpd="sng">
+          <a:solidFill>
+            <a:schemeClr val="phClr">
+              <a:shade val="95000"/>
+              <a:satMod val="105000"/>
+            </a:schemeClr>
+          </a:solidFill>
+          <a:prstDash val="solid"/>
+        </a:ln>
+        <a:ln w="25400" algn="ctr" cap="flat" cmpd="sng">
+          <a:solidFill>
+            <a:schemeClr val="phClr"/>
+          </a:solidFill>
+          <a:prstDash val="solid"/>
+        </a:ln>
+        <a:ln w="38100" algn="ctr" cap="flat" cmpd="sng">
+          <a:solidFill>
+            <a:schemeClr val="phClr"/>
+          </a:solidFill>
+          <a:prstDash val="solid"/>
+        </a:ln>
+      </a:lnStyleLst>
+      <a:effectStyleLst>
+        <a:effectStyle>
+          <a:effectLst>
+            <a:outerShdw rotWithShape="0" dir="5400000" blurRad="40000" dist="20000">
+              <a:srgbClr val="000000">
+                <a:alpha val="38000"/>
+              </a:srgbClr>
+            </a:outerShdw>
+          </a:effectLst>
+        </a:effectStyle>
+        <a:effectStyle>
+          <a:effectLst>
+            <a:outerShdw rotWithShape="0" dir="5400000" blurRad="40000" dist="23000">
+              <a:srgbClr val="000000">
+                <a:alpha val="35000"/>
+              </a:srgbClr>
+            </a:outerShdw>
+          </a:effectLst>
+        </a:effectStyle>
+        <a:effectStyle>
+          <a:effectLst>
+            <a:outerShdw rotWithShape="0" dir="5400000" blurRad="40000" dist="23000">
+              <a:srgbClr val="000000">
+                <a:alpha val="35000"/>
+              </a:srgbClr>
+            </a:outerShdw>
+          </a:effectLst>
+          <a:scene3d>
+            <a:camera prst="orthographicFront">
+              <a:rot rev="0" lon="0" lat="0"/>
+            </a:camera>
+            <a:lightRig dir="t" rig="threePt">
+              <a:rot rev="1200000" lon="0" lat="0"/>
+            </a:lightRig>
+          </a:scene3d>
+          <a:sp3d>
+            <a:bevelT w="63500" h="25400"/>
+          </a:sp3d>
+        </a:effectStyle>
+      </a:effectStyleLst>
+      <a:bgFillStyleLst>
+        <a:solidFill>
+          <a:schemeClr val="phClr"/>
+        </a:solidFill>
+        <a:gradFill rotWithShape="1">
+          <a:gsLst>
+            <a:gs pos="0">
+              <a:schemeClr val="phClr">
+                <a:tint val="40000"/>
+                <a:satMod val="350000"/>
+              </a:schemeClr>
+            </a:gs>
+            <a:gs pos="40000">
+              <a:schemeClr val="phClr">
+                <a:tint val="45000"/>
+                <a:shade val="99000"/>
+                <a:satMod val="350000"/>
+              </a:schemeClr>
+            </a:gs>
+            <a:gs pos="100000">
+              <a:schemeClr val="phClr">
+                <a:shade val="20000"/>
+                <a:satMod val="255000"/>
+              </a:schemeClr>
+            </a:gs>
+          </a:gsLst>
+          <a:path path="circle">
+            <a:fillToRect t="-80000" b="180000" r="50000" l="50000"/>
+          </a:path>
+        </a:gradFill>
+        <a:gradFill rotWithShape="1">
+          <a:gsLst>
+            <a:gs pos="0">
+              <a:schemeClr val="phClr">
+                <a:tint val="80000"/>
+                <a:satMod val="300000"/>
+              </a:schemeClr>
+            </a:gs>
+            <a:gs pos="100000">
+              <a:schemeClr val="phClr">
+                <a:shade val="30000"/>
+                <a:satMod val="200000"/>
+              </a:schemeClr>
+            </a:gs>
+          </a:gsLst>
+          <a:path path="circle">
+            <a:fillToRect t="50000" b="50000" r="50000" l="50000"/>
+          </a:path>
+        </a:gradFill>
+      </a:bgFillStyleLst>
+    </a:fmtScheme>
+  </a:themeElements>
+</a:theme>
+</file>
+
+<file path=ppt/theme/theme3.xml><?xml version="1.0" encoding="utf-8"?>
 <a:theme xmlns:a="http://schemas.openxmlformats.org/drawingml/2006/main" xmlns:r="http://schemas.openxmlformats.org/officeDocument/2006/relationships" name="light-gradient">
   <a:themeElements>
     <a:clrScheme name="Custom 347">
@@ -7778,281 +8392,4 @@
     </a:fmtScheme>
   </a:themeElements>
 </a:theme>
-</file>
-
-<file path=ppt/theme/theme3.xml><?xml version="1.0" encoding="utf-8"?>
-<a:theme xmlns:a="http://schemas.openxmlformats.org/drawingml/2006/main" xmlns:r="http://schemas.openxmlformats.org/officeDocument/2006/relationships" name="Custom Theme">
-  <a:themeElements>
-    <a:clrScheme name="Default">
-      <a:dk1>
-        <a:srgbClr val="000000"/>
-      </a:dk1>
-      <a:lt1>
-        <a:srgbClr val="FFFFFF"/>
-      </a:lt1>
-      <a:dk2>
-        <a:srgbClr val="158158"/>
-      </a:dk2>
-      <a:lt2>
-        <a:srgbClr val="F3F3F3"/>
-      </a:lt2>
-      <a:accent1>
-        <a:srgbClr val="058DC7"/>
-      </a:accent1>
-      <a:accent2>
-        <a:srgbClr val="50B432"/>
-      </a:accent2>
-      <a:accent3>
-        <a:srgbClr val="ED561B"/>
-      </a:accent3>
-      <a:accent4>
-        <a:srgbClr val="EDEF00"/>
-      </a:accent4>
-      <a:accent5>
-        <a:srgbClr val="24CBE5"/>
-      </a:accent5>
-      <a:accent6>
-        <a:srgbClr val="64E572"/>
-      </a:accent6>
-      <a:hlink>
-        <a:srgbClr val="2200CC"/>
-      </a:hlink>
-      <a:folHlink>
-        <a:srgbClr val="551A8B"/>
-      </a:folHlink>
-    </a:clrScheme>
-    <a:fontScheme name="Office">
-      <a:majorFont>
-        <a:latin typeface="Arial"/>
-        <a:ea typeface=""/>
-        <a:cs typeface=""/>
-        <a:font typeface="ＭＳ Ｐゴシック" script="Jpan"/>
-        <a:font typeface="맑은 고딕" script="Hang"/>
-        <a:font typeface="宋体" script="Hans"/>
-        <a:font typeface="新細明體" script="Hant"/>
-        <a:font typeface="Times New Roman" script="Arab"/>
-        <a:font typeface="Times New Roman" script="Hebr"/>
-        <a:font typeface="Angsana New" script="Thai"/>
-        <a:font typeface="Nyala" script="Ethi"/>
-        <a:font typeface="Vrinda" script="Beng"/>
-        <a:font typeface="Shruti" script="Gujr"/>
-        <a:font typeface="MoolBoran" script="Khmr"/>
-        <a:font typeface="Tunga" script="Knda"/>
-        <a:font typeface="Raavi" script="Guru"/>
-        <a:font typeface="Euphemia" script="Cans"/>
-        <a:font typeface="Plantagenet Cherokee" script="Cher"/>
-        <a:font typeface="Microsoft Yi Baiti" script="Yiii"/>
-        <a:font typeface="Microsoft Himalaya" script="Tibt"/>
-        <a:font typeface="MV Boli" script="Thaa"/>
-        <a:font typeface="Mangal" script="Deva"/>
-        <a:font typeface="Gautami" script="Telu"/>
-        <a:font typeface="Latha" script="Taml"/>
-        <a:font typeface="Estrangelo Edessa" script="Syrc"/>
-        <a:font typeface="Kalinga" script="Orya"/>
-        <a:font typeface="Kartika" script="Mlym"/>
-        <a:font typeface="DokChampa" script="Laoo"/>
-        <a:font typeface="Iskoola Pota" script="Sinh"/>
-        <a:font typeface="Mongolian Baiti" script="Mong"/>
-        <a:font typeface="Times New Roman" script="Viet"/>
-        <a:font typeface="Microsoft Uighur" script="Uigh"/>
-      </a:majorFont>
-      <a:minorFont>
-        <a:latin typeface="Arial"/>
-        <a:ea typeface=""/>
-        <a:cs typeface=""/>
-        <a:font typeface="ＭＳ Ｐゴシック" script="Jpan"/>
-        <a:font typeface="맑은 고딕" script="Hang"/>
-        <a:font typeface="宋体" script="Hans"/>
-        <a:font typeface="新細明體" script="Hant"/>
-        <a:font typeface="Times New Roman" script="Arab"/>
-        <a:font typeface="Times New Roman" script="Hebr"/>
-        <a:font typeface="Angsana New" script="Thai"/>
-        <a:font typeface="Nyala" script="Ethi"/>
-        <a:font typeface="Vrinda" script="Beng"/>
-        <a:font typeface="Shruti" script="Gujr"/>
-        <a:font typeface="MoolBoran" script="Khmr"/>
-        <a:font typeface="Tunga" script="Knda"/>
-        <a:font typeface="Raavi" script="Guru"/>
-        <a:font typeface="Euphemia" script="Cans"/>
-        <a:font typeface="Plantagenet Cherokee" script="Cher"/>
-        <a:font typeface="Microsoft Yi Baiti" script="Yiii"/>
-        <a:font typeface="Microsoft Himalaya" script="Tibt"/>
-        <a:font typeface="MV Boli" script="Thaa"/>
-        <a:font typeface="Mangal" script="Deva"/>
-        <a:font typeface="Gautami" script="Telu"/>
-        <a:font typeface="Latha" script="Taml"/>
-        <a:font typeface="Estrangelo Edessa" script="Syrc"/>
-        <a:font typeface="Kalinga" script="Orya"/>
-        <a:font typeface="Kartika" script="Mlym"/>
-        <a:font typeface="DokChampa" script="Laoo"/>
-        <a:font typeface="Iskoola Pota" script="Sinh"/>
-        <a:font typeface="Mongolian Baiti" script="Mong"/>
-        <a:font typeface="Times New Roman" script="Viet"/>
-        <a:font typeface="Microsoft Uighur" script="Uigh"/>
-      </a:minorFont>
-    </a:fontScheme>
-    <a:fmtScheme name="Office">
-      <a:fillStyleLst>
-        <a:solidFill>
-          <a:schemeClr val="phClr"/>
-        </a:solidFill>
-        <a:gradFill rotWithShape="1">
-          <a:gsLst>
-            <a:gs pos="0">
-              <a:schemeClr val="phClr">
-                <a:tint val="50000"/>
-                <a:satMod val="300000"/>
-              </a:schemeClr>
-            </a:gs>
-            <a:gs pos="35000">
-              <a:schemeClr val="phClr">
-                <a:tint val="37000"/>
-                <a:satMod val="300000"/>
-              </a:schemeClr>
-            </a:gs>
-            <a:gs pos="100000">
-              <a:schemeClr val="phClr">
-                <a:tint val="15000"/>
-                <a:satMod val="350000"/>
-              </a:schemeClr>
-            </a:gs>
-          </a:gsLst>
-          <a:lin ang="16200000" scaled="1"/>
-        </a:gradFill>
-        <a:gradFill rotWithShape="1">
-          <a:gsLst>
-            <a:gs pos="0">
-              <a:schemeClr val="phClr">
-                <a:tint val="100000"/>
-                <a:shade val="100000"/>
-                <a:satMod val="130000"/>
-              </a:schemeClr>
-            </a:gs>
-            <a:gs pos="100000">
-              <a:schemeClr val="phClr">
-                <a:tint val="50000"/>
-                <a:shade val="100000"/>
-                <a:satMod val="350000"/>
-              </a:schemeClr>
-            </a:gs>
-          </a:gsLst>
-          <a:lin ang="16200000" scaled="0"/>
-        </a:gradFill>
-      </a:fillStyleLst>
-      <a:lnStyleLst>
-        <a:ln w="9525" algn="ctr" cap="flat" cmpd="sng">
-          <a:solidFill>
-            <a:schemeClr val="phClr">
-              <a:shade val="95000"/>
-              <a:satMod val="105000"/>
-            </a:schemeClr>
-          </a:solidFill>
-          <a:prstDash val="solid"/>
-        </a:ln>
-        <a:ln w="25400" algn="ctr" cap="flat" cmpd="sng">
-          <a:solidFill>
-            <a:schemeClr val="phClr"/>
-          </a:solidFill>
-          <a:prstDash val="solid"/>
-        </a:ln>
-        <a:ln w="38100" algn="ctr" cap="flat" cmpd="sng">
-          <a:solidFill>
-            <a:schemeClr val="phClr"/>
-          </a:solidFill>
-          <a:prstDash val="solid"/>
-        </a:ln>
-      </a:lnStyleLst>
-      <a:effectStyleLst>
-        <a:effectStyle>
-          <a:effectLst>
-            <a:outerShdw rotWithShape="0" dir="5400000" blurRad="40000" dist="20000">
-              <a:srgbClr val="000000">
-                <a:alpha val="38000"/>
-              </a:srgbClr>
-            </a:outerShdw>
-          </a:effectLst>
-        </a:effectStyle>
-        <a:effectStyle>
-          <a:effectLst>
-            <a:outerShdw rotWithShape="0" dir="5400000" blurRad="40000" dist="23000">
-              <a:srgbClr val="000000">
-                <a:alpha val="35000"/>
-              </a:srgbClr>
-            </a:outerShdw>
-          </a:effectLst>
-        </a:effectStyle>
-        <a:effectStyle>
-          <a:effectLst>
-            <a:outerShdw rotWithShape="0" dir="5400000" blurRad="40000" dist="23000">
-              <a:srgbClr val="000000">
-                <a:alpha val="35000"/>
-              </a:srgbClr>
-            </a:outerShdw>
-          </a:effectLst>
-          <a:scene3d>
-            <a:camera prst="orthographicFront">
-              <a:rot rev="0" lon="0" lat="0"/>
-            </a:camera>
-            <a:lightRig dir="t" rig="threePt">
-              <a:rot rev="1200000" lon="0" lat="0"/>
-            </a:lightRig>
-          </a:scene3d>
-          <a:sp3d>
-            <a:bevelT w="63500" h="25400"/>
-          </a:sp3d>
-        </a:effectStyle>
-      </a:effectStyleLst>
-      <a:bgFillStyleLst>
-        <a:solidFill>
-          <a:schemeClr val="phClr"/>
-        </a:solidFill>
-        <a:gradFill rotWithShape="1">
-          <a:gsLst>
-            <a:gs pos="0">
-              <a:schemeClr val="phClr">
-                <a:tint val="40000"/>
-                <a:satMod val="350000"/>
-              </a:schemeClr>
-            </a:gs>
-            <a:gs pos="40000">
-              <a:schemeClr val="phClr">
-                <a:tint val="45000"/>
-                <a:shade val="99000"/>
-                <a:satMod val="350000"/>
-              </a:schemeClr>
-            </a:gs>
-            <a:gs pos="100000">
-              <a:schemeClr val="phClr">
-                <a:shade val="20000"/>
-                <a:satMod val="255000"/>
-              </a:schemeClr>
-            </a:gs>
-          </a:gsLst>
-          <a:path path="circle">
-            <a:fillToRect t="-80000" b="180000" r="50000" l="50000"/>
-          </a:path>
-        </a:gradFill>
-        <a:gradFill rotWithShape="1">
-          <a:gsLst>
-            <a:gs pos="0">
-              <a:schemeClr val="phClr">
-                <a:tint val="80000"/>
-                <a:satMod val="300000"/>
-              </a:schemeClr>
-            </a:gs>
-            <a:gs pos="100000">
-              <a:schemeClr val="phClr">
-                <a:shade val="30000"/>
-                <a:satMod val="200000"/>
-              </a:schemeClr>
-            </a:gs>
-          </a:gsLst>
-          <a:path path="circle">
-            <a:fillToRect t="50000" b="50000" r="50000" l="50000"/>
-          </a:path>
-        </a:gradFill>
-      </a:bgFillStyleLst>
-    </a:fmtScheme>
-  </a:themeElements>
-</a:theme>
 </file>
</xml_diff>